<commit_message>
Updated concentration calculations and stressor worklists
</commit_message>
<xml_diff>
--- a/Drafts/MixToxJam.pptx
+++ b/Drafts/MixToxJam.pptx
@@ -5442,7 +5442,10 @@
             <a:avLst/>
           </a:prstGeom>
           <a:solidFill>
-            <a:schemeClr val="tx1"/>
+            <a:schemeClr val="accent4">
+              <a:lumMod val="20000"/>
+              <a:lumOff val="80000"/>
+            </a:schemeClr>
           </a:solidFill>
           <a:ln>
             <a:noFill/>
@@ -5473,7 +5476,7 @@
               <a:rPr lang="en-GB" sz="4000" dirty="0">
                 <a:latin typeface="Keep Calm Med" pitchFamily="2" charset="0"/>
               </a:rPr>
-              <a:t>Gi</a:t>
+              <a:t>Me</a:t>
             </a:r>
           </a:p>
         </p:txBody>

</xml_diff>